<commit_message>
clase sawaro y avance de proyecto
</commit_message>
<xml_diff>
--- a/II. 08 Minería de Datos II/Presentación1.pptx
+++ b/II. 08 Minería de Datos II/Presentación1.pptx
@@ -5,7 +5,7 @@
     <p:sldMasterId id="2147483648" r:id="rId1"/>
   </p:sldMasterIdLst>
   <p:notesMasterIdLst>
-    <p:notesMasterId r:id="rId12"/>
+    <p:notesMasterId r:id="rId24"/>
   </p:notesMasterIdLst>
   <p:sldIdLst>
     <p:sldId id="702" r:id="rId2"/>
@@ -15,9 +15,21 @@
     <p:sldId id="706" r:id="rId6"/>
     <p:sldId id="707" r:id="rId7"/>
     <p:sldId id="711" r:id="rId8"/>
-    <p:sldId id="708" r:id="rId9"/>
-    <p:sldId id="709" r:id="rId10"/>
-    <p:sldId id="710" r:id="rId11"/>
+    <p:sldId id="716" r:id="rId9"/>
+    <p:sldId id="717" r:id="rId10"/>
+    <p:sldId id="718" r:id="rId11"/>
+    <p:sldId id="708" r:id="rId12"/>
+    <p:sldId id="709" r:id="rId13"/>
+    <p:sldId id="710" r:id="rId14"/>
+    <p:sldId id="712" r:id="rId15"/>
+    <p:sldId id="713" r:id="rId16"/>
+    <p:sldId id="714" r:id="rId17"/>
+    <p:sldId id="715" r:id="rId18"/>
+    <p:sldId id="720" r:id="rId19"/>
+    <p:sldId id="719" r:id="rId20"/>
+    <p:sldId id="721" r:id="rId21"/>
+    <p:sldId id="723" r:id="rId22"/>
+    <p:sldId id="722" r:id="rId23"/>
   </p:sldIdLst>
   <p:sldSz cx="12192000" cy="6858000"/>
   <p:notesSz cx="6858000" cy="9144000"/>
@@ -206,7 +218,7 @@
           <a:p>
             <a:fld id="{9196C1A8-949D-4494-95F1-1D95A7D081EB}" type="datetimeFigureOut">
               <a:rPr lang="en-US" smtClean="0"/>
-              <a:t>7/29/2022</a:t>
+              <a:t>8/6/2022</a:t>
             </a:fld>
             <a:endParaRPr lang="en-US"/>
           </a:p>
@@ -707,7 +719,7 @@
           <a:p>
             <a:fld id="{81930577-A43E-49B3-9565-CB47936B187D}" type="datetimeFigureOut">
               <a:rPr lang="en-US" smtClean="0"/>
-              <a:t>7/29/2022</a:t>
+              <a:t>8/6/2022</a:t>
             </a:fld>
             <a:endParaRPr lang="en-US"/>
           </a:p>
@@ -907,7 +919,7 @@
           <a:p>
             <a:fld id="{81930577-A43E-49B3-9565-CB47936B187D}" type="datetimeFigureOut">
               <a:rPr lang="en-US" smtClean="0"/>
-              <a:t>7/29/2022</a:t>
+              <a:t>8/6/2022</a:t>
             </a:fld>
             <a:endParaRPr lang="en-US"/>
           </a:p>
@@ -1117,7 +1129,7 @@
           <a:p>
             <a:fld id="{81930577-A43E-49B3-9565-CB47936B187D}" type="datetimeFigureOut">
               <a:rPr lang="en-US" smtClean="0"/>
-              <a:t>7/29/2022</a:t>
+              <a:t>8/6/2022</a:t>
             </a:fld>
             <a:endParaRPr lang="en-US"/>
           </a:p>
@@ -1317,7 +1329,7 @@
           <a:p>
             <a:fld id="{81930577-A43E-49B3-9565-CB47936B187D}" type="datetimeFigureOut">
               <a:rPr lang="en-US" smtClean="0"/>
-              <a:t>7/29/2022</a:t>
+              <a:t>8/6/2022</a:t>
             </a:fld>
             <a:endParaRPr lang="en-US"/>
           </a:p>
@@ -1593,7 +1605,7 @@
           <a:p>
             <a:fld id="{81930577-A43E-49B3-9565-CB47936B187D}" type="datetimeFigureOut">
               <a:rPr lang="en-US" smtClean="0"/>
-              <a:t>7/29/2022</a:t>
+              <a:t>8/6/2022</a:t>
             </a:fld>
             <a:endParaRPr lang="en-US"/>
           </a:p>
@@ -1861,7 +1873,7 @@
           <a:p>
             <a:fld id="{81930577-A43E-49B3-9565-CB47936B187D}" type="datetimeFigureOut">
               <a:rPr lang="en-US" smtClean="0"/>
-              <a:t>7/29/2022</a:t>
+              <a:t>8/6/2022</a:t>
             </a:fld>
             <a:endParaRPr lang="en-US"/>
           </a:p>
@@ -2276,7 +2288,7 @@
           <a:p>
             <a:fld id="{81930577-A43E-49B3-9565-CB47936B187D}" type="datetimeFigureOut">
               <a:rPr lang="en-US" smtClean="0"/>
-              <a:t>7/29/2022</a:t>
+              <a:t>8/6/2022</a:t>
             </a:fld>
             <a:endParaRPr lang="en-US"/>
           </a:p>
@@ -2418,7 +2430,7 @@
           <a:p>
             <a:fld id="{81930577-A43E-49B3-9565-CB47936B187D}" type="datetimeFigureOut">
               <a:rPr lang="en-US" smtClean="0"/>
-              <a:t>7/29/2022</a:t>
+              <a:t>8/6/2022</a:t>
             </a:fld>
             <a:endParaRPr lang="en-US"/>
           </a:p>
@@ -2531,7 +2543,7 @@
           <a:p>
             <a:fld id="{81930577-A43E-49B3-9565-CB47936B187D}" type="datetimeFigureOut">
               <a:rPr lang="en-US" smtClean="0"/>
-              <a:t>7/29/2022</a:t>
+              <a:t>8/6/2022</a:t>
             </a:fld>
             <a:endParaRPr lang="en-US"/>
           </a:p>
@@ -2844,7 +2856,7 @@
           <a:p>
             <a:fld id="{81930577-A43E-49B3-9565-CB47936B187D}" type="datetimeFigureOut">
               <a:rPr lang="en-US" smtClean="0"/>
-              <a:t>7/29/2022</a:t>
+              <a:t>8/6/2022</a:t>
             </a:fld>
             <a:endParaRPr lang="en-US"/>
           </a:p>
@@ -3133,7 +3145,7 @@
           <a:p>
             <a:fld id="{81930577-A43E-49B3-9565-CB47936B187D}" type="datetimeFigureOut">
               <a:rPr lang="en-US" smtClean="0"/>
-              <a:t>7/29/2022</a:t>
+              <a:t>8/6/2022</a:t>
             </a:fld>
             <a:endParaRPr lang="en-US"/>
           </a:p>
@@ -3376,7 +3388,7 @@
           <a:p>
             <a:fld id="{81930577-A43E-49B3-9565-CB47936B187D}" type="datetimeFigureOut">
               <a:rPr lang="en-US" smtClean="0"/>
-              <a:t>7/29/2022</a:t>
+              <a:t>8/6/2022</a:t>
             </a:fld>
             <a:endParaRPr lang="en-US"/>
           </a:p>
@@ -3853,12 +3865,432 @@
           <a:chExt cx="0" cy="0"/>
         </a:xfrm>
       </p:grpSpPr>
+      <p:sp>
+        <p:nvSpPr>
+          <p:cNvPr id="2" name="CuadroTexto 1">
+            <a:extLst>
+              <a:ext uri="{FF2B5EF4-FFF2-40B4-BE49-F238E27FC236}">
+                <a16:creationId xmlns:a16="http://schemas.microsoft.com/office/drawing/2014/main" id="{1B6E42D4-E5F1-4FED-BD50-EBDFA2FE7C6B}"/>
+              </a:ext>
+            </a:extLst>
+          </p:cNvPr>
+          <p:cNvSpPr txBox="1"/>
+          <p:nvPr/>
+        </p:nvSpPr>
+        <p:spPr>
+          <a:xfrm>
+            <a:off x="927704" y="653981"/>
+            <a:ext cx="4327851" cy="523220"/>
+          </a:xfrm>
+          <a:prstGeom prst="rect">
+            <a:avLst/>
+          </a:prstGeom>
+          <a:noFill/>
+        </p:spPr>
+        <p:txBody>
+          <a:bodyPr wrap="none" rtlCol="0">
+            <a:spAutoFit/>
+          </a:bodyPr>
+          <a:lstStyle/>
+          <a:p>
+            <a:r>
+              <a:rPr lang="en-US" sz="2800" dirty="0" err="1">
+                <a:solidFill>
+                  <a:srgbClr val="0070C0"/>
+                </a:solidFill>
+              </a:rPr>
+              <a:t>Planteamiento</a:t>
+            </a:r>
+            <a:r>
+              <a:rPr lang="en-US" sz="2800" dirty="0">
+                <a:solidFill>
+                  <a:srgbClr val="0070C0"/>
+                </a:solidFill>
+              </a:rPr>
+              <a:t> del </a:t>
+            </a:r>
+            <a:r>
+              <a:rPr lang="en-US" sz="2800" dirty="0" err="1">
+                <a:solidFill>
+                  <a:srgbClr val="0070C0"/>
+                </a:solidFill>
+              </a:rPr>
+              <a:t>Problema</a:t>
+            </a:r>
+            <a:endParaRPr lang="en-US" sz="2800" dirty="0">
+              <a:solidFill>
+                <a:srgbClr val="0070C0"/>
+              </a:solidFill>
+            </a:endParaRPr>
+          </a:p>
+        </p:txBody>
+      </p:sp>
+      <p:sp>
+        <p:nvSpPr>
+          <p:cNvPr id="3" name="CuadroTexto 2">
+            <a:extLst>
+              <a:ext uri="{FF2B5EF4-FFF2-40B4-BE49-F238E27FC236}">
+                <a16:creationId xmlns:a16="http://schemas.microsoft.com/office/drawing/2014/main" id="{B7AD633D-732E-4E2A-B6EE-2D77148DFDDA}"/>
+              </a:ext>
+            </a:extLst>
+          </p:cNvPr>
+          <p:cNvSpPr txBox="1"/>
+          <p:nvPr/>
+        </p:nvSpPr>
+        <p:spPr>
+          <a:xfrm>
+            <a:off x="811560" y="1588397"/>
+            <a:ext cx="10568879" cy="830997"/>
+          </a:xfrm>
+          <a:prstGeom prst="rect">
+            <a:avLst/>
+          </a:prstGeom>
+          <a:noFill/>
+        </p:spPr>
+        <p:txBody>
+          <a:bodyPr wrap="square" rtlCol="0">
+            <a:spAutoFit/>
+          </a:bodyPr>
+          <a:lstStyle/>
+          <a:p>
+            <a:r>
+              <a:rPr lang="es-BO" sz="2400" dirty="0"/>
+              <a:t>Análisis de leyes y decretos de la legislación boliviana mediante </a:t>
+            </a:r>
+            <a:r>
+              <a:rPr lang="es-BO" sz="2400" dirty="0" err="1"/>
+              <a:t>Named</a:t>
+            </a:r>
+            <a:r>
+              <a:rPr lang="es-BO" sz="2400" dirty="0"/>
+              <a:t> </a:t>
+            </a:r>
+            <a:r>
+              <a:rPr lang="es-BO" sz="2400" dirty="0" err="1"/>
+              <a:t>Entity</a:t>
+            </a:r>
+            <a:r>
+              <a:rPr lang="es-BO" sz="2400" dirty="0"/>
+              <a:t> </a:t>
+            </a:r>
+            <a:r>
+              <a:rPr lang="es-BO" sz="2400" dirty="0" err="1"/>
+              <a:t>Recognition</a:t>
+            </a:r>
+            <a:r>
+              <a:rPr lang="es-BO" sz="2400" dirty="0"/>
+              <a:t>.</a:t>
+            </a:r>
+            <a:endParaRPr lang="en-US" sz="2400" dirty="0"/>
+          </a:p>
+        </p:txBody>
+      </p:sp>
+      <p:sp>
+        <p:nvSpPr>
+          <p:cNvPr id="4" name="CuadroTexto 3">
+            <a:extLst>
+              <a:ext uri="{FF2B5EF4-FFF2-40B4-BE49-F238E27FC236}">
+                <a16:creationId xmlns:a16="http://schemas.microsoft.com/office/drawing/2014/main" id="{73D108D2-6174-4ECF-B0EF-D6B0EC8452FC}"/>
+              </a:ext>
+            </a:extLst>
+          </p:cNvPr>
+          <p:cNvSpPr txBox="1"/>
+          <p:nvPr/>
+        </p:nvSpPr>
+        <p:spPr>
+          <a:xfrm>
+            <a:off x="927703" y="3613557"/>
+            <a:ext cx="2205604" cy="523220"/>
+          </a:xfrm>
+          <a:prstGeom prst="rect">
+            <a:avLst/>
+          </a:prstGeom>
+          <a:noFill/>
+        </p:spPr>
+        <p:txBody>
+          <a:bodyPr wrap="none" rtlCol="0">
+            <a:spAutoFit/>
+          </a:bodyPr>
+          <a:lstStyle/>
+          <a:p>
+            <a:r>
+              <a:rPr lang="en-US" sz="2800" dirty="0">
+                <a:solidFill>
+                  <a:srgbClr val="0070C0"/>
+                </a:solidFill>
+              </a:rPr>
+              <a:t>Base de </a:t>
+            </a:r>
+            <a:r>
+              <a:rPr lang="en-US" sz="2800" dirty="0" err="1">
+                <a:solidFill>
+                  <a:srgbClr val="0070C0"/>
+                </a:solidFill>
+              </a:rPr>
+              <a:t>datos</a:t>
+            </a:r>
+            <a:endParaRPr lang="en-US" sz="2800" dirty="0">
+              <a:solidFill>
+                <a:srgbClr val="0070C0"/>
+              </a:solidFill>
+            </a:endParaRPr>
+          </a:p>
+        </p:txBody>
+      </p:sp>
+      <p:sp>
+        <p:nvSpPr>
+          <p:cNvPr id="5" name="CuadroTexto 4">
+            <a:extLst>
+              <a:ext uri="{FF2B5EF4-FFF2-40B4-BE49-F238E27FC236}">
+                <a16:creationId xmlns:a16="http://schemas.microsoft.com/office/drawing/2014/main" id="{7D862125-6D3E-4ED8-80C0-AC9E6D65E19C}"/>
+              </a:ext>
+            </a:extLst>
+          </p:cNvPr>
+          <p:cNvSpPr txBox="1"/>
+          <p:nvPr/>
+        </p:nvSpPr>
+        <p:spPr>
+          <a:xfrm>
+            <a:off x="927703" y="4136777"/>
+            <a:ext cx="10568879" cy="461665"/>
+          </a:xfrm>
+          <a:prstGeom prst="rect">
+            <a:avLst/>
+          </a:prstGeom>
+          <a:noFill/>
+        </p:spPr>
+        <p:txBody>
+          <a:bodyPr wrap="square" rtlCol="0">
+            <a:spAutoFit/>
+          </a:bodyPr>
+          <a:lstStyle/>
+          <a:p>
+            <a:r>
+              <a:rPr lang="en-US" sz="2400" dirty="0" err="1"/>
+              <a:t>Gaceta</a:t>
+            </a:r>
+            <a:r>
+              <a:rPr lang="en-US" sz="2400" dirty="0"/>
+              <a:t> </a:t>
+            </a:r>
+            <a:r>
+              <a:rPr lang="en-US" sz="2400" dirty="0" err="1"/>
+              <a:t>Oficial</a:t>
+            </a:r>
+            <a:r>
+              <a:rPr lang="en-US" sz="2400" dirty="0"/>
+              <a:t> de Bolivia (</a:t>
+            </a:r>
+            <a:r>
+              <a:rPr lang="en-US" sz="2400" dirty="0" err="1"/>
+              <a:t>leyes</a:t>
+            </a:r>
+            <a:r>
+              <a:rPr lang="en-US" sz="2400" dirty="0"/>
+              <a:t> y </a:t>
+            </a:r>
+            <a:r>
+              <a:rPr lang="en-US" sz="2400" dirty="0" err="1"/>
+              <a:t>decretos</a:t>
+            </a:r>
+            <a:r>
+              <a:rPr lang="en-US" sz="2400" dirty="0"/>
+              <a:t> supremos </a:t>
+            </a:r>
+            <a:r>
+              <a:rPr lang="en-US" sz="2400" dirty="0" err="1"/>
+              <a:t>en</a:t>
+            </a:r>
+            <a:r>
+              <a:rPr lang="en-US" sz="2400" dirty="0"/>
+              <a:t> pdf)</a:t>
+            </a:r>
+          </a:p>
+        </p:txBody>
+      </p:sp>
+      <p:sp>
+        <p:nvSpPr>
+          <p:cNvPr id="6" name="CuadroTexto 5">
+            <a:extLst>
+              <a:ext uri="{FF2B5EF4-FFF2-40B4-BE49-F238E27FC236}">
+                <a16:creationId xmlns:a16="http://schemas.microsoft.com/office/drawing/2014/main" id="{72377235-2693-4EB6-8818-97BD1BBDF19A}"/>
+              </a:ext>
+            </a:extLst>
+          </p:cNvPr>
+          <p:cNvSpPr txBox="1"/>
+          <p:nvPr/>
+        </p:nvSpPr>
+        <p:spPr>
+          <a:xfrm>
+            <a:off x="927703" y="5496133"/>
+            <a:ext cx="2068067" cy="523220"/>
+          </a:xfrm>
+          <a:prstGeom prst="rect">
+            <a:avLst/>
+          </a:prstGeom>
+          <a:noFill/>
+        </p:spPr>
+        <p:txBody>
+          <a:bodyPr wrap="none" rtlCol="0">
+            <a:spAutoFit/>
+          </a:bodyPr>
+          <a:lstStyle/>
+          <a:p>
+            <a:r>
+              <a:rPr lang="en-US" sz="2800" dirty="0" err="1">
+                <a:solidFill>
+                  <a:srgbClr val="0070C0"/>
+                </a:solidFill>
+              </a:rPr>
+              <a:t>Contribuci</a:t>
+            </a:r>
+            <a:r>
+              <a:rPr lang="es-BO" sz="2800" dirty="0" err="1">
+                <a:solidFill>
+                  <a:srgbClr val="0070C0"/>
+                </a:solidFill>
+              </a:rPr>
+              <a:t>ón</a:t>
+            </a:r>
+            <a:endParaRPr lang="en-US" sz="2800" dirty="0">
+              <a:solidFill>
+                <a:srgbClr val="0070C0"/>
+              </a:solidFill>
+            </a:endParaRPr>
+          </a:p>
+        </p:txBody>
+      </p:sp>
+      <p:sp>
+        <p:nvSpPr>
+          <p:cNvPr id="10" name="CuadroTexto 9">
+            <a:extLst>
+              <a:ext uri="{FF2B5EF4-FFF2-40B4-BE49-F238E27FC236}">
+                <a16:creationId xmlns:a16="http://schemas.microsoft.com/office/drawing/2014/main" id="{11F84CB9-2F8D-45E6-BAAA-1A2D73551890}"/>
+              </a:ext>
+            </a:extLst>
+          </p:cNvPr>
+          <p:cNvSpPr txBox="1"/>
+          <p:nvPr/>
+        </p:nvSpPr>
+        <p:spPr>
+          <a:xfrm>
+            <a:off x="10200443" y="275208"/>
+            <a:ext cx="878889" cy="646331"/>
+          </a:xfrm>
+          <a:prstGeom prst="rect">
+            <a:avLst/>
+          </a:prstGeom>
+          <a:noFill/>
+        </p:spPr>
+        <p:txBody>
+          <a:bodyPr wrap="square" rtlCol="0">
+            <a:spAutoFit/>
+          </a:bodyPr>
+          <a:lstStyle/>
+          <a:p>
+            <a:r>
+              <a:rPr lang="es-BO" sz="3600" dirty="0"/>
+              <a:t>3</a:t>
+            </a:r>
+            <a:endParaRPr lang="en-US" sz="3600" dirty="0"/>
+          </a:p>
+        </p:txBody>
+      </p:sp>
+      <p:sp>
+        <p:nvSpPr>
+          <p:cNvPr id="12" name="CuadroTexto 11">
+            <a:extLst>
+              <a:ext uri="{FF2B5EF4-FFF2-40B4-BE49-F238E27FC236}">
+                <a16:creationId xmlns:a16="http://schemas.microsoft.com/office/drawing/2014/main" id="{A7AA5D49-F874-449C-B98A-4C7E321A8662}"/>
+              </a:ext>
+            </a:extLst>
+          </p:cNvPr>
+          <p:cNvSpPr txBox="1"/>
+          <p:nvPr/>
+        </p:nvSpPr>
+        <p:spPr>
+          <a:xfrm>
+            <a:off x="927703" y="6019353"/>
+            <a:ext cx="10568879" cy="461665"/>
+          </a:xfrm>
+          <a:prstGeom prst="rect">
+            <a:avLst/>
+          </a:prstGeom>
+          <a:noFill/>
+        </p:spPr>
+        <p:txBody>
+          <a:bodyPr wrap="square" rtlCol="0">
+            <a:spAutoFit/>
+          </a:bodyPr>
+          <a:lstStyle/>
+          <a:p>
+            <a:r>
+              <a:rPr lang="en-US" sz="2400" dirty="0"/>
+              <a:t>Named Entity Recognition para </a:t>
+            </a:r>
+            <a:r>
+              <a:rPr lang="en-US" sz="2400" dirty="0" err="1"/>
+              <a:t>Análsis</a:t>
+            </a:r>
+            <a:r>
+              <a:rPr lang="en-US" sz="2400" dirty="0"/>
+              <a:t> de </a:t>
+            </a:r>
+            <a:r>
+              <a:rPr lang="en-US" sz="2400" dirty="0" err="1"/>
+              <a:t>relaciones</a:t>
+            </a:r>
+            <a:r>
+              <a:rPr lang="en-US" sz="2400" dirty="0"/>
+              <a:t> (</a:t>
+            </a:r>
+            <a:r>
+              <a:rPr lang="en-US" sz="2400" dirty="0" err="1"/>
+              <a:t>graphos</a:t>
+            </a:r>
+            <a:r>
+              <a:rPr lang="en-US" sz="2400" dirty="0"/>
+              <a:t>)</a:t>
+            </a:r>
+          </a:p>
+        </p:txBody>
+      </p:sp>
+    </p:spTree>
+    <p:extLst>
+      <p:ext uri="{BB962C8B-B14F-4D97-AF65-F5344CB8AC3E}">
+        <p14:creationId xmlns:p14="http://schemas.microsoft.com/office/powerpoint/2010/main" val="2317593875"/>
+      </p:ext>
+    </p:extLst>
+  </p:cSld>
+  <p:clrMapOvr>
+    <a:masterClrMapping/>
+  </p:clrMapOvr>
+</p:sld>
+</file>
+
+<file path=ppt/slides/slide11.xml><?xml version="1.0" encoding="utf-8"?>
+<p:sld xmlns:a="http://schemas.openxmlformats.org/drawingml/2006/main" xmlns:r="http://schemas.openxmlformats.org/officeDocument/2006/relationships" xmlns:p="http://schemas.openxmlformats.org/presentationml/2006/main">
+  <p:cSld>
+    <p:spTree>
+      <p:nvGrpSpPr>
+        <p:cNvPr id="1" name=""/>
+        <p:cNvGrpSpPr/>
+        <p:nvPr/>
+      </p:nvGrpSpPr>
+      <p:grpSpPr>
+        <a:xfrm>
+          <a:off x="0" y="0"/>
+          <a:ext cx="0" cy="0"/>
+          <a:chOff x="0" y="0"/>
+          <a:chExt cx="0" cy="0"/>
+        </a:xfrm>
+      </p:grpSpPr>
       <p:pic>
         <p:nvPicPr>
           <p:cNvPr id="3" name="Imagen 2">
             <a:extLst>
               <a:ext uri="{FF2B5EF4-FFF2-40B4-BE49-F238E27FC236}">
-                <a16:creationId xmlns:a16="http://schemas.microsoft.com/office/drawing/2014/main" id="{2613E159-3EB5-46BB-97DF-45DE58D69E84}"/>
+                <a16:creationId xmlns:a16="http://schemas.microsoft.com/office/drawing/2014/main" id="{05C45915-A8AB-40FE-82AF-B6681D176968}"/>
               </a:ext>
             </a:extLst>
           </p:cNvPr>
@@ -3875,6 +4307,126 @@
         </p:blipFill>
         <p:spPr>
           <a:xfrm>
+            <a:off x="1504318" y="1068050"/>
+            <a:ext cx="9260950" cy="4205286"/>
+          </a:xfrm>
+          <a:prstGeom prst="rect">
+            <a:avLst/>
+          </a:prstGeom>
+        </p:spPr>
+      </p:pic>
+    </p:spTree>
+    <p:extLst>
+      <p:ext uri="{BB962C8B-B14F-4D97-AF65-F5344CB8AC3E}">
+        <p14:creationId xmlns:p14="http://schemas.microsoft.com/office/powerpoint/2010/main" val="3463968538"/>
+      </p:ext>
+    </p:extLst>
+  </p:cSld>
+  <p:clrMapOvr>
+    <a:masterClrMapping/>
+  </p:clrMapOvr>
+</p:sld>
+</file>
+
+<file path=ppt/slides/slide12.xml><?xml version="1.0" encoding="utf-8"?>
+<p:sld xmlns:a="http://schemas.openxmlformats.org/drawingml/2006/main" xmlns:r="http://schemas.openxmlformats.org/officeDocument/2006/relationships" xmlns:p="http://schemas.openxmlformats.org/presentationml/2006/main">
+  <p:cSld>
+    <p:spTree>
+      <p:nvGrpSpPr>
+        <p:cNvPr id="1" name=""/>
+        <p:cNvGrpSpPr/>
+        <p:nvPr/>
+      </p:nvGrpSpPr>
+      <p:grpSpPr>
+        <a:xfrm>
+          <a:off x="0" y="0"/>
+          <a:ext cx="0" cy="0"/>
+          <a:chOff x="0" y="0"/>
+          <a:chExt cx="0" cy="0"/>
+        </a:xfrm>
+      </p:grpSpPr>
+      <p:pic>
+        <p:nvPicPr>
+          <p:cNvPr id="3" name="Imagen 2">
+            <a:extLst>
+              <a:ext uri="{FF2B5EF4-FFF2-40B4-BE49-F238E27FC236}">
+                <a16:creationId xmlns:a16="http://schemas.microsoft.com/office/drawing/2014/main" id="{E55FA54D-0F3A-420A-92F4-308BBFA4DC8F}"/>
+              </a:ext>
+            </a:extLst>
+          </p:cNvPr>
+          <p:cNvPicPr>
+            <a:picLocks noChangeAspect="1"/>
+          </p:cNvPicPr>
+          <p:nvPr/>
+        </p:nvPicPr>
+        <p:blipFill>
+          <a:blip r:embed="rId2"/>
+          <a:stretch>
+            <a:fillRect/>
+          </a:stretch>
+        </p:blipFill>
+        <p:spPr>
+          <a:xfrm>
+            <a:off x="2803050" y="1154272"/>
+            <a:ext cx="6148468" cy="4003653"/>
+          </a:xfrm>
+          <a:prstGeom prst="rect">
+            <a:avLst/>
+          </a:prstGeom>
+        </p:spPr>
+      </p:pic>
+    </p:spTree>
+    <p:extLst>
+      <p:ext uri="{BB962C8B-B14F-4D97-AF65-F5344CB8AC3E}">
+        <p14:creationId xmlns:p14="http://schemas.microsoft.com/office/powerpoint/2010/main" val="240425033"/>
+      </p:ext>
+    </p:extLst>
+  </p:cSld>
+  <p:clrMapOvr>
+    <a:masterClrMapping/>
+  </p:clrMapOvr>
+</p:sld>
+</file>
+
+<file path=ppt/slides/slide13.xml><?xml version="1.0" encoding="utf-8"?>
+<p:sld xmlns:a="http://schemas.openxmlformats.org/drawingml/2006/main" xmlns:r="http://schemas.openxmlformats.org/officeDocument/2006/relationships" xmlns:p="http://schemas.openxmlformats.org/presentationml/2006/main">
+  <p:cSld>
+    <p:spTree>
+      <p:nvGrpSpPr>
+        <p:cNvPr id="1" name=""/>
+        <p:cNvGrpSpPr/>
+        <p:nvPr/>
+      </p:nvGrpSpPr>
+      <p:grpSpPr>
+        <a:xfrm>
+          <a:off x="0" y="0"/>
+          <a:ext cx="0" cy="0"/>
+          <a:chOff x="0" y="0"/>
+          <a:chExt cx="0" cy="0"/>
+        </a:xfrm>
+      </p:grpSpPr>
+      <p:pic>
+        <p:nvPicPr>
+          <p:cNvPr id="3" name="Imagen 2">
+            <a:extLst>
+              <a:ext uri="{FF2B5EF4-FFF2-40B4-BE49-F238E27FC236}">
+                <a16:creationId xmlns:a16="http://schemas.microsoft.com/office/drawing/2014/main" id="{2613E159-3EB5-46BB-97DF-45DE58D69E84}"/>
+              </a:ext>
+            </a:extLst>
+          </p:cNvPr>
+          <p:cNvPicPr>
+            <a:picLocks noChangeAspect="1"/>
+          </p:cNvPicPr>
+          <p:nvPr/>
+        </p:nvPicPr>
+        <p:blipFill>
+          <a:blip r:embed="rId2"/>
+          <a:stretch>
+            <a:fillRect/>
+          </a:stretch>
+        </p:blipFill>
+        <p:spPr>
+          <a:xfrm>
             <a:off x="2887702" y="2228746"/>
             <a:ext cx="6416596" cy="2400508"/>
           </a:xfrm>
@@ -3887,6 +4439,371 @@
     <p:extLst>
       <p:ext uri="{BB962C8B-B14F-4D97-AF65-F5344CB8AC3E}">
         <p14:creationId xmlns:p14="http://schemas.microsoft.com/office/powerpoint/2010/main" val="1982258172"/>
+      </p:ext>
+    </p:extLst>
+  </p:cSld>
+  <p:clrMapOvr>
+    <a:masterClrMapping/>
+  </p:clrMapOvr>
+</p:sld>
+</file>
+
+<file path=ppt/slides/slide14.xml><?xml version="1.0" encoding="utf-8"?>
+<p:sld xmlns:a="http://schemas.openxmlformats.org/drawingml/2006/main" xmlns:r="http://schemas.openxmlformats.org/officeDocument/2006/relationships" xmlns:p="http://schemas.openxmlformats.org/presentationml/2006/main">
+  <p:cSld>
+    <p:spTree>
+      <p:nvGrpSpPr>
+        <p:cNvPr id="1" name=""/>
+        <p:cNvGrpSpPr/>
+        <p:nvPr/>
+      </p:nvGrpSpPr>
+      <p:grpSpPr>
+        <a:xfrm>
+          <a:off x="0" y="0"/>
+          <a:ext cx="0" cy="0"/>
+          <a:chOff x="0" y="0"/>
+          <a:chExt cx="0" cy="0"/>
+        </a:xfrm>
+      </p:grpSpPr>
+      <p:pic>
+        <p:nvPicPr>
+          <p:cNvPr id="3" name="Imagen 2">
+            <a:extLst>
+              <a:ext uri="{FF2B5EF4-FFF2-40B4-BE49-F238E27FC236}">
+                <a16:creationId xmlns:a16="http://schemas.microsoft.com/office/drawing/2014/main" id="{CBD3B812-1374-413A-9337-EFFAD5B7D559}"/>
+              </a:ext>
+            </a:extLst>
+          </p:cNvPr>
+          <p:cNvPicPr>
+            <a:picLocks noChangeAspect="1"/>
+          </p:cNvPicPr>
+          <p:nvPr/>
+        </p:nvPicPr>
+        <p:blipFill>
+          <a:blip r:embed="rId2"/>
+          <a:stretch>
+            <a:fillRect/>
+          </a:stretch>
+        </p:blipFill>
+        <p:spPr>
+          <a:xfrm>
+            <a:off x="425523" y="913278"/>
+            <a:ext cx="11487517" cy="4528733"/>
+          </a:xfrm>
+          <a:prstGeom prst="rect">
+            <a:avLst/>
+          </a:prstGeom>
+        </p:spPr>
+      </p:pic>
+    </p:spTree>
+    <p:extLst>
+      <p:ext uri="{BB962C8B-B14F-4D97-AF65-F5344CB8AC3E}">
+        <p14:creationId xmlns:p14="http://schemas.microsoft.com/office/powerpoint/2010/main" val="1855189663"/>
+      </p:ext>
+    </p:extLst>
+  </p:cSld>
+  <p:clrMapOvr>
+    <a:masterClrMapping/>
+  </p:clrMapOvr>
+</p:sld>
+</file>
+
+<file path=ppt/slides/slide15.xml><?xml version="1.0" encoding="utf-8"?>
+<p:sld xmlns:a="http://schemas.openxmlformats.org/drawingml/2006/main" xmlns:r="http://schemas.openxmlformats.org/officeDocument/2006/relationships" xmlns:p="http://schemas.openxmlformats.org/presentationml/2006/main">
+  <p:cSld>
+    <p:spTree>
+      <p:nvGrpSpPr>
+        <p:cNvPr id="1" name=""/>
+        <p:cNvGrpSpPr/>
+        <p:nvPr/>
+      </p:nvGrpSpPr>
+      <p:grpSpPr>
+        <a:xfrm>
+          <a:off x="0" y="0"/>
+          <a:ext cx="0" cy="0"/>
+          <a:chOff x="0" y="0"/>
+          <a:chExt cx="0" cy="0"/>
+        </a:xfrm>
+      </p:grpSpPr>
+      <p:pic>
+        <p:nvPicPr>
+          <p:cNvPr id="3" name="Imagen 2">
+            <a:extLst>
+              <a:ext uri="{FF2B5EF4-FFF2-40B4-BE49-F238E27FC236}">
+                <a16:creationId xmlns:a16="http://schemas.microsoft.com/office/drawing/2014/main" id="{0CA80AA2-D7FF-44EC-8DE5-7CF52CFE01C4}"/>
+              </a:ext>
+            </a:extLst>
+          </p:cNvPr>
+          <p:cNvPicPr>
+            <a:picLocks noChangeAspect="1"/>
+          </p:cNvPicPr>
+          <p:nvPr/>
+        </p:nvPicPr>
+        <p:blipFill>
+          <a:blip r:embed="rId2"/>
+          <a:stretch>
+            <a:fillRect/>
+          </a:stretch>
+        </p:blipFill>
+        <p:spPr>
+          <a:xfrm>
+            <a:off x="1183109" y="1072683"/>
+            <a:ext cx="9784418" cy="3969833"/>
+          </a:xfrm>
+          <a:prstGeom prst="rect">
+            <a:avLst/>
+          </a:prstGeom>
+        </p:spPr>
+      </p:pic>
+    </p:spTree>
+    <p:extLst>
+      <p:ext uri="{BB962C8B-B14F-4D97-AF65-F5344CB8AC3E}">
+        <p14:creationId xmlns:p14="http://schemas.microsoft.com/office/powerpoint/2010/main" val="3810797812"/>
+      </p:ext>
+    </p:extLst>
+  </p:cSld>
+  <p:clrMapOvr>
+    <a:masterClrMapping/>
+  </p:clrMapOvr>
+</p:sld>
+</file>
+
+<file path=ppt/slides/slide16.xml><?xml version="1.0" encoding="utf-8"?>
+<p:sld xmlns:a="http://schemas.openxmlformats.org/drawingml/2006/main" xmlns:r="http://schemas.openxmlformats.org/officeDocument/2006/relationships" xmlns:p="http://schemas.openxmlformats.org/presentationml/2006/main">
+  <p:cSld>
+    <p:spTree>
+      <p:nvGrpSpPr>
+        <p:cNvPr id="1" name=""/>
+        <p:cNvGrpSpPr/>
+        <p:nvPr/>
+      </p:nvGrpSpPr>
+      <p:grpSpPr>
+        <a:xfrm>
+          <a:off x="0" y="0"/>
+          <a:ext cx="0" cy="0"/>
+          <a:chOff x="0" y="0"/>
+          <a:chExt cx="0" cy="0"/>
+        </a:xfrm>
+      </p:grpSpPr>
+      <p:sp>
+        <p:nvSpPr>
+          <p:cNvPr id="3" name="CuadroTexto 2">
+            <a:extLst>
+              <a:ext uri="{FF2B5EF4-FFF2-40B4-BE49-F238E27FC236}">
+                <a16:creationId xmlns:a16="http://schemas.microsoft.com/office/drawing/2014/main" id="{20C2080B-3D62-4A61-A4D7-6B92532153EA}"/>
+              </a:ext>
+            </a:extLst>
+          </p:cNvPr>
+          <p:cNvSpPr txBox="1"/>
+          <p:nvPr/>
+        </p:nvSpPr>
+        <p:spPr>
+          <a:xfrm>
+            <a:off x="3047260" y="3246553"/>
+            <a:ext cx="6094520" cy="369332"/>
+          </a:xfrm>
+          <a:prstGeom prst="rect">
+            <a:avLst/>
+          </a:prstGeom>
+          <a:noFill/>
+        </p:spPr>
+        <p:txBody>
+          <a:bodyPr wrap="square">
+            <a:spAutoFit/>
+          </a:bodyPr>
+          <a:lstStyle/>
+          <a:p>
+            <a:r>
+              <a:rPr lang="en-US" dirty="0"/>
+              <a:t>hugo.jair@gmail.com</a:t>
+            </a:r>
+          </a:p>
+        </p:txBody>
+      </p:sp>
+    </p:spTree>
+    <p:extLst>
+      <p:ext uri="{BB962C8B-B14F-4D97-AF65-F5344CB8AC3E}">
+        <p14:creationId xmlns:p14="http://schemas.microsoft.com/office/powerpoint/2010/main" val="2018273334"/>
+      </p:ext>
+    </p:extLst>
+  </p:cSld>
+  <p:clrMapOvr>
+    <a:masterClrMapping/>
+  </p:clrMapOvr>
+</p:sld>
+</file>
+
+<file path=ppt/slides/slide17.xml><?xml version="1.0" encoding="utf-8"?>
+<p:sld xmlns:a="http://schemas.openxmlformats.org/drawingml/2006/main" xmlns:r="http://schemas.openxmlformats.org/officeDocument/2006/relationships" xmlns:p="http://schemas.openxmlformats.org/presentationml/2006/main">
+  <p:cSld>
+    <p:spTree>
+      <p:nvGrpSpPr>
+        <p:cNvPr id="1" name=""/>
+        <p:cNvGrpSpPr/>
+        <p:nvPr/>
+      </p:nvGrpSpPr>
+      <p:grpSpPr>
+        <a:xfrm>
+          <a:off x="0" y="0"/>
+          <a:ext cx="0" cy="0"/>
+          <a:chOff x="0" y="0"/>
+          <a:chExt cx="0" cy="0"/>
+        </a:xfrm>
+      </p:grpSpPr>
+      <p:pic>
+        <p:nvPicPr>
+          <p:cNvPr id="3" name="Imagen 2">
+            <a:extLst>
+              <a:ext uri="{FF2B5EF4-FFF2-40B4-BE49-F238E27FC236}">
+                <a16:creationId xmlns:a16="http://schemas.microsoft.com/office/drawing/2014/main" id="{0E9F44D6-5F83-4B93-A1BC-21801BBDC75C}"/>
+              </a:ext>
+            </a:extLst>
+          </p:cNvPr>
+          <p:cNvPicPr>
+            <a:picLocks noChangeAspect="1"/>
+          </p:cNvPicPr>
+          <p:nvPr/>
+        </p:nvPicPr>
+        <p:blipFill>
+          <a:blip r:embed="rId2"/>
+          <a:stretch>
+            <a:fillRect/>
+          </a:stretch>
+        </p:blipFill>
+        <p:spPr>
+          <a:xfrm>
+            <a:off x="315729" y="643648"/>
+            <a:ext cx="11560542" cy="5570703"/>
+          </a:xfrm>
+          <a:prstGeom prst="rect">
+            <a:avLst/>
+          </a:prstGeom>
+        </p:spPr>
+      </p:pic>
+    </p:spTree>
+    <p:extLst>
+      <p:ext uri="{BB962C8B-B14F-4D97-AF65-F5344CB8AC3E}">
+        <p14:creationId xmlns:p14="http://schemas.microsoft.com/office/powerpoint/2010/main" val="2572051212"/>
+      </p:ext>
+    </p:extLst>
+  </p:cSld>
+  <p:clrMapOvr>
+    <a:masterClrMapping/>
+  </p:clrMapOvr>
+</p:sld>
+</file>
+
+<file path=ppt/slides/slide18.xml><?xml version="1.0" encoding="utf-8"?>
+<p:sld xmlns:a="http://schemas.openxmlformats.org/drawingml/2006/main" xmlns:r="http://schemas.openxmlformats.org/officeDocument/2006/relationships" xmlns:p="http://schemas.openxmlformats.org/presentationml/2006/main">
+  <p:cSld>
+    <p:spTree>
+      <p:nvGrpSpPr>
+        <p:cNvPr id="1" name=""/>
+        <p:cNvGrpSpPr/>
+        <p:nvPr/>
+      </p:nvGrpSpPr>
+      <p:grpSpPr>
+        <a:xfrm>
+          <a:off x="0" y="0"/>
+          <a:ext cx="0" cy="0"/>
+          <a:chOff x="0" y="0"/>
+          <a:chExt cx="0" cy="0"/>
+        </a:xfrm>
+      </p:grpSpPr>
+      <p:pic>
+        <p:nvPicPr>
+          <p:cNvPr id="3" name="Imagen 2">
+            <a:extLst>
+              <a:ext uri="{FF2B5EF4-FFF2-40B4-BE49-F238E27FC236}">
+                <a16:creationId xmlns:a16="http://schemas.microsoft.com/office/drawing/2014/main" id="{AF72B79F-4C24-4604-8B29-1950F2424B12}"/>
+              </a:ext>
+            </a:extLst>
+          </p:cNvPr>
+          <p:cNvPicPr>
+            <a:picLocks noChangeAspect="1"/>
+          </p:cNvPicPr>
+          <p:nvPr/>
+        </p:nvPicPr>
+        <p:blipFill>
+          <a:blip r:embed="rId2"/>
+          <a:stretch>
+            <a:fillRect/>
+          </a:stretch>
+        </p:blipFill>
+        <p:spPr>
+          <a:xfrm>
+            <a:off x="2420642" y="1184166"/>
+            <a:ext cx="6719061" cy="4568564"/>
+          </a:xfrm>
+          <a:prstGeom prst="rect">
+            <a:avLst/>
+          </a:prstGeom>
+        </p:spPr>
+      </p:pic>
+    </p:spTree>
+    <p:extLst>
+      <p:ext uri="{BB962C8B-B14F-4D97-AF65-F5344CB8AC3E}">
+        <p14:creationId xmlns:p14="http://schemas.microsoft.com/office/powerpoint/2010/main" val="3113846028"/>
+      </p:ext>
+    </p:extLst>
+  </p:cSld>
+  <p:clrMapOvr>
+    <a:masterClrMapping/>
+  </p:clrMapOvr>
+</p:sld>
+</file>
+
+<file path=ppt/slides/slide19.xml><?xml version="1.0" encoding="utf-8"?>
+<p:sld xmlns:a="http://schemas.openxmlformats.org/drawingml/2006/main" xmlns:r="http://schemas.openxmlformats.org/officeDocument/2006/relationships" xmlns:p="http://schemas.openxmlformats.org/presentationml/2006/main">
+  <p:cSld>
+    <p:spTree>
+      <p:nvGrpSpPr>
+        <p:cNvPr id="1" name=""/>
+        <p:cNvGrpSpPr/>
+        <p:nvPr/>
+      </p:nvGrpSpPr>
+      <p:grpSpPr>
+        <a:xfrm>
+          <a:off x="0" y="0"/>
+          <a:ext cx="0" cy="0"/>
+          <a:chOff x="0" y="0"/>
+          <a:chExt cx="0" cy="0"/>
+        </a:xfrm>
+      </p:grpSpPr>
+      <p:pic>
+        <p:nvPicPr>
+          <p:cNvPr id="3" name="Imagen 2">
+            <a:extLst>
+              <a:ext uri="{FF2B5EF4-FFF2-40B4-BE49-F238E27FC236}">
+                <a16:creationId xmlns:a16="http://schemas.microsoft.com/office/drawing/2014/main" id="{DE726624-F7EC-48F4-B428-080F152ED5B9}"/>
+              </a:ext>
+            </a:extLst>
+          </p:cNvPr>
+          <p:cNvPicPr>
+            <a:picLocks noChangeAspect="1"/>
+          </p:cNvPicPr>
+          <p:nvPr/>
+        </p:nvPicPr>
+        <p:blipFill>
+          <a:blip r:embed="rId2"/>
+          <a:stretch>
+            <a:fillRect/>
+          </a:stretch>
+        </p:blipFill>
+        <p:spPr>
+          <a:xfrm>
+            <a:off x="3413527" y="1531455"/>
+            <a:ext cx="5364945" cy="3795089"/>
+          </a:xfrm>
+          <a:prstGeom prst="rect">
+            <a:avLst/>
+          </a:prstGeom>
+        </p:spPr>
+      </p:pic>
+    </p:spTree>
+    <p:extLst>
+      <p:ext uri="{BB962C8B-B14F-4D97-AF65-F5344CB8AC3E}">
+        <p14:creationId xmlns:p14="http://schemas.microsoft.com/office/powerpoint/2010/main" val="1050875240"/>
       </p:ext>
     </p:extLst>
   </p:cSld>
@@ -3947,6 +4864,191 @@
     <p:extLst>
       <p:ext uri="{BB962C8B-B14F-4D97-AF65-F5344CB8AC3E}">
         <p14:creationId xmlns:p14="http://schemas.microsoft.com/office/powerpoint/2010/main" val="1081686796"/>
+      </p:ext>
+    </p:extLst>
+  </p:cSld>
+  <p:clrMapOvr>
+    <a:masterClrMapping/>
+  </p:clrMapOvr>
+</p:sld>
+</file>
+
+<file path=ppt/slides/slide20.xml><?xml version="1.0" encoding="utf-8"?>
+<p:sld xmlns:a="http://schemas.openxmlformats.org/drawingml/2006/main" xmlns:r="http://schemas.openxmlformats.org/officeDocument/2006/relationships" xmlns:p="http://schemas.openxmlformats.org/presentationml/2006/main">
+  <p:cSld>
+    <p:spTree>
+      <p:nvGrpSpPr>
+        <p:cNvPr id="1" name=""/>
+        <p:cNvGrpSpPr/>
+        <p:nvPr/>
+      </p:nvGrpSpPr>
+      <p:grpSpPr>
+        <a:xfrm>
+          <a:off x="0" y="0"/>
+          <a:ext cx="0" cy="0"/>
+          <a:chOff x="0" y="0"/>
+          <a:chExt cx="0" cy="0"/>
+        </a:xfrm>
+      </p:grpSpPr>
+      <p:pic>
+        <p:nvPicPr>
+          <p:cNvPr id="3" name="Imagen 2">
+            <a:extLst>
+              <a:ext uri="{FF2B5EF4-FFF2-40B4-BE49-F238E27FC236}">
+                <a16:creationId xmlns:a16="http://schemas.microsoft.com/office/drawing/2014/main" id="{2AB96671-70AC-4A03-BE68-AF2AA118E8C4}"/>
+              </a:ext>
+            </a:extLst>
+          </p:cNvPr>
+          <p:cNvPicPr>
+            <a:picLocks noChangeAspect="1"/>
+          </p:cNvPicPr>
+          <p:nvPr/>
+        </p:nvPicPr>
+        <p:blipFill>
+          <a:blip r:embed="rId2"/>
+          <a:stretch>
+            <a:fillRect/>
+          </a:stretch>
+        </p:blipFill>
+        <p:spPr>
+          <a:xfrm>
+            <a:off x="2425003" y="543716"/>
+            <a:ext cx="7020837" cy="5565742"/>
+          </a:xfrm>
+          <a:prstGeom prst="rect">
+            <a:avLst/>
+          </a:prstGeom>
+        </p:spPr>
+      </p:pic>
+    </p:spTree>
+    <p:extLst>
+      <p:ext uri="{BB962C8B-B14F-4D97-AF65-F5344CB8AC3E}">
+        <p14:creationId xmlns:p14="http://schemas.microsoft.com/office/powerpoint/2010/main" val="3973193563"/>
+      </p:ext>
+    </p:extLst>
+  </p:cSld>
+  <p:clrMapOvr>
+    <a:masterClrMapping/>
+  </p:clrMapOvr>
+</p:sld>
+</file>
+
+<file path=ppt/slides/slide21.xml><?xml version="1.0" encoding="utf-8"?>
+<p:sld xmlns:a="http://schemas.openxmlformats.org/drawingml/2006/main" xmlns:r="http://schemas.openxmlformats.org/officeDocument/2006/relationships" xmlns:p="http://schemas.openxmlformats.org/presentationml/2006/main">
+  <p:cSld>
+    <p:spTree>
+      <p:nvGrpSpPr>
+        <p:cNvPr id="1" name=""/>
+        <p:cNvGrpSpPr/>
+        <p:nvPr/>
+      </p:nvGrpSpPr>
+      <p:grpSpPr>
+        <a:xfrm>
+          <a:off x="0" y="0"/>
+          <a:ext cx="0" cy="0"/>
+          <a:chOff x="0" y="0"/>
+          <a:chExt cx="0" cy="0"/>
+        </a:xfrm>
+      </p:grpSpPr>
+      <p:sp>
+        <p:nvSpPr>
+          <p:cNvPr id="3" name="CuadroTexto 2">
+            <a:extLst>
+              <a:ext uri="{FF2B5EF4-FFF2-40B4-BE49-F238E27FC236}">
+                <a16:creationId xmlns:a16="http://schemas.microsoft.com/office/drawing/2014/main" id="{3665F0C7-291D-4B9E-8B58-F746F6D5CDA3}"/>
+              </a:ext>
+            </a:extLst>
+          </p:cNvPr>
+          <p:cNvSpPr txBox="1"/>
+          <p:nvPr/>
+        </p:nvSpPr>
+        <p:spPr>
+          <a:xfrm>
+            <a:off x="3047260" y="3108054"/>
+            <a:ext cx="6094520" cy="646331"/>
+          </a:xfrm>
+          <a:prstGeom prst="rect">
+            <a:avLst/>
+          </a:prstGeom>
+          <a:noFill/>
+        </p:spPr>
+        <p:txBody>
+          <a:bodyPr wrap="square">
+            <a:spAutoFit/>
+          </a:bodyPr>
+          <a:lstStyle/>
+          <a:p>
+            <a:r>
+              <a:rPr lang="en-US" dirty="0"/>
+              <a:t>https://colab.research.google.com/drive/1vWekierXxQPqx432uHmDXVwZuDykl4sy?usp=sharing</a:t>
+            </a:r>
+          </a:p>
+        </p:txBody>
+      </p:sp>
+    </p:spTree>
+    <p:extLst>
+      <p:ext uri="{BB962C8B-B14F-4D97-AF65-F5344CB8AC3E}">
+        <p14:creationId xmlns:p14="http://schemas.microsoft.com/office/powerpoint/2010/main" val="2764084508"/>
+      </p:ext>
+    </p:extLst>
+  </p:cSld>
+  <p:clrMapOvr>
+    <a:masterClrMapping/>
+  </p:clrMapOvr>
+</p:sld>
+</file>
+
+<file path=ppt/slides/slide22.xml><?xml version="1.0" encoding="utf-8"?>
+<p:sld xmlns:a="http://schemas.openxmlformats.org/drawingml/2006/main" xmlns:r="http://schemas.openxmlformats.org/officeDocument/2006/relationships" xmlns:p="http://schemas.openxmlformats.org/presentationml/2006/main">
+  <p:cSld>
+    <p:spTree>
+      <p:nvGrpSpPr>
+        <p:cNvPr id="1" name=""/>
+        <p:cNvGrpSpPr/>
+        <p:nvPr/>
+      </p:nvGrpSpPr>
+      <p:grpSpPr>
+        <a:xfrm>
+          <a:off x="0" y="0"/>
+          <a:ext cx="0" cy="0"/>
+          <a:chOff x="0" y="0"/>
+          <a:chExt cx="0" cy="0"/>
+        </a:xfrm>
+      </p:grpSpPr>
+      <p:pic>
+        <p:nvPicPr>
+          <p:cNvPr id="3" name="Imagen 2">
+            <a:extLst>
+              <a:ext uri="{FF2B5EF4-FFF2-40B4-BE49-F238E27FC236}">
+                <a16:creationId xmlns:a16="http://schemas.microsoft.com/office/drawing/2014/main" id="{FE37E101-2051-40EA-9BA3-99FDBCF25217}"/>
+              </a:ext>
+            </a:extLst>
+          </p:cNvPr>
+          <p:cNvPicPr>
+            <a:picLocks noChangeAspect="1"/>
+          </p:cNvPicPr>
+          <p:nvPr/>
+        </p:nvPicPr>
+        <p:blipFill>
+          <a:blip r:embed="rId2"/>
+          <a:stretch>
+            <a:fillRect/>
+          </a:stretch>
+        </p:blipFill>
+        <p:spPr>
+          <a:xfrm>
+            <a:off x="1004418" y="1068638"/>
+            <a:ext cx="9464537" cy="3991633"/>
+          </a:xfrm>
+          <a:prstGeom prst="rect">
+            <a:avLst/>
+          </a:prstGeom>
+        </p:spPr>
+      </p:pic>
+    </p:spTree>
+    <p:extLst>
+      <p:ext uri="{BB962C8B-B14F-4D97-AF65-F5344CB8AC3E}">
+        <p14:creationId xmlns:p14="http://schemas.microsoft.com/office/powerpoint/2010/main" val="2808746461"/>
       </p:ext>
     </p:extLst>
   </p:cSld>
@@ -4316,7 +5418,7 @@
         </p:blipFill>
         <p:spPr>
           <a:xfrm>
-            <a:off x="2731478" y="1691489"/>
+            <a:off x="2731478" y="2073228"/>
             <a:ext cx="6729043" cy="3475021"/>
           </a:xfrm>
           <a:prstGeom prst="rect">
@@ -4354,40 +5456,453 @@
           <a:chExt cx="0" cy="0"/>
         </a:xfrm>
       </p:grpSpPr>
-      <p:pic>
-        <p:nvPicPr>
-          <p:cNvPr id="3" name="Imagen 2">
-            <a:extLst>
-              <a:ext uri="{FF2B5EF4-FFF2-40B4-BE49-F238E27FC236}">
-                <a16:creationId xmlns:a16="http://schemas.microsoft.com/office/drawing/2014/main" id="{05C45915-A8AB-40FE-82AF-B6681D176968}"/>
-              </a:ext>
-            </a:extLst>
-          </p:cNvPr>
-          <p:cNvPicPr>
-            <a:picLocks noChangeAspect="1"/>
-          </p:cNvPicPr>
+      <p:sp>
+        <p:nvSpPr>
+          <p:cNvPr id="2" name="CuadroTexto 1">
+            <a:extLst>
+              <a:ext uri="{FF2B5EF4-FFF2-40B4-BE49-F238E27FC236}">
+                <a16:creationId xmlns:a16="http://schemas.microsoft.com/office/drawing/2014/main" id="{1B6E42D4-E5F1-4FED-BD50-EBDFA2FE7C6B}"/>
+              </a:ext>
+            </a:extLst>
+          </p:cNvPr>
+          <p:cNvSpPr txBox="1"/>
           <p:nvPr/>
-        </p:nvPicPr>
-        <p:blipFill>
-          <a:blip r:embed="rId2"/>
-          <a:stretch>
-            <a:fillRect/>
-          </a:stretch>
-        </p:blipFill>
-        <p:spPr>
-          <a:xfrm>
-            <a:off x="1504318" y="1068050"/>
-            <a:ext cx="9260950" cy="4205286"/>
+        </p:nvSpPr>
+        <p:spPr>
+          <a:xfrm>
+            <a:off x="927704" y="653981"/>
+            <a:ext cx="4327851" cy="523220"/>
           </a:xfrm>
           <a:prstGeom prst="rect">
             <a:avLst/>
           </a:prstGeom>
-        </p:spPr>
-      </p:pic>
+          <a:noFill/>
+        </p:spPr>
+        <p:txBody>
+          <a:bodyPr wrap="none" rtlCol="0">
+            <a:spAutoFit/>
+          </a:bodyPr>
+          <a:lstStyle/>
+          <a:p>
+            <a:r>
+              <a:rPr lang="en-US" sz="2800" dirty="0" err="1">
+                <a:solidFill>
+                  <a:srgbClr val="0070C0"/>
+                </a:solidFill>
+              </a:rPr>
+              <a:t>Planteamiento</a:t>
+            </a:r>
+            <a:r>
+              <a:rPr lang="en-US" sz="2800" dirty="0">
+                <a:solidFill>
+                  <a:srgbClr val="0070C0"/>
+                </a:solidFill>
+              </a:rPr>
+              <a:t> del </a:t>
+            </a:r>
+            <a:r>
+              <a:rPr lang="en-US" sz="2800" dirty="0" err="1">
+                <a:solidFill>
+                  <a:srgbClr val="0070C0"/>
+                </a:solidFill>
+              </a:rPr>
+              <a:t>Problema</a:t>
+            </a:r>
+            <a:endParaRPr lang="en-US" sz="2800" dirty="0">
+              <a:solidFill>
+                <a:srgbClr val="0070C0"/>
+              </a:solidFill>
+            </a:endParaRPr>
+          </a:p>
+        </p:txBody>
+      </p:sp>
+      <p:sp>
+        <p:nvSpPr>
+          <p:cNvPr id="3" name="CuadroTexto 2">
+            <a:extLst>
+              <a:ext uri="{FF2B5EF4-FFF2-40B4-BE49-F238E27FC236}">
+                <a16:creationId xmlns:a16="http://schemas.microsoft.com/office/drawing/2014/main" id="{B7AD633D-732E-4E2A-B6EE-2D77148DFDDA}"/>
+              </a:ext>
+            </a:extLst>
+          </p:cNvPr>
+          <p:cNvSpPr txBox="1"/>
+          <p:nvPr/>
+        </p:nvSpPr>
+        <p:spPr>
+          <a:xfrm>
+            <a:off x="927703" y="1606859"/>
+            <a:ext cx="10568879" cy="830997"/>
+          </a:xfrm>
+          <a:prstGeom prst="rect">
+            <a:avLst/>
+          </a:prstGeom>
+          <a:noFill/>
+        </p:spPr>
+        <p:txBody>
+          <a:bodyPr wrap="square" rtlCol="0">
+            <a:spAutoFit/>
+          </a:bodyPr>
+          <a:lstStyle/>
+          <a:p>
+            <a:r>
+              <a:rPr lang="es-BO" sz="2400" dirty="0"/>
+              <a:t>El tiempo destinado en la apropiación de transacciones diarias es aproximadamente 1 hora diaria y con espacio al error humano.</a:t>
+            </a:r>
+            <a:endParaRPr lang="en-US" sz="2400" dirty="0"/>
+          </a:p>
+        </p:txBody>
+      </p:sp>
+      <p:sp>
+        <p:nvSpPr>
+          <p:cNvPr id="4" name="CuadroTexto 3">
+            <a:extLst>
+              <a:ext uri="{FF2B5EF4-FFF2-40B4-BE49-F238E27FC236}">
+                <a16:creationId xmlns:a16="http://schemas.microsoft.com/office/drawing/2014/main" id="{73D108D2-6174-4ECF-B0EF-D6B0EC8452FC}"/>
+              </a:ext>
+            </a:extLst>
+          </p:cNvPr>
+          <p:cNvSpPr txBox="1"/>
+          <p:nvPr/>
+        </p:nvSpPr>
+        <p:spPr>
+          <a:xfrm>
+            <a:off x="927704" y="3587327"/>
+            <a:ext cx="2205604" cy="523220"/>
+          </a:xfrm>
+          <a:prstGeom prst="rect">
+            <a:avLst/>
+          </a:prstGeom>
+          <a:noFill/>
+        </p:spPr>
+        <p:txBody>
+          <a:bodyPr wrap="none" rtlCol="0">
+            <a:spAutoFit/>
+          </a:bodyPr>
+          <a:lstStyle/>
+          <a:p>
+            <a:r>
+              <a:rPr lang="en-US" sz="2800" dirty="0">
+                <a:solidFill>
+                  <a:srgbClr val="0070C0"/>
+                </a:solidFill>
+              </a:rPr>
+              <a:t>Base de </a:t>
+            </a:r>
+            <a:r>
+              <a:rPr lang="en-US" sz="2800" dirty="0" err="1">
+                <a:solidFill>
+                  <a:srgbClr val="0070C0"/>
+                </a:solidFill>
+              </a:rPr>
+              <a:t>datos</a:t>
+            </a:r>
+            <a:endParaRPr lang="en-US" sz="2800" dirty="0">
+              <a:solidFill>
+                <a:srgbClr val="0070C0"/>
+              </a:solidFill>
+            </a:endParaRPr>
+          </a:p>
+        </p:txBody>
+      </p:sp>
+      <p:sp>
+        <p:nvSpPr>
+          <p:cNvPr id="5" name="CuadroTexto 4">
+            <a:extLst>
+              <a:ext uri="{FF2B5EF4-FFF2-40B4-BE49-F238E27FC236}">
+                <a16:creationId xmlns:a16="http://schemas.microsoft.com/office/drawing/2014/main" id="{7D862125-6D3E-4ED8-80C0-AC9E6D65E19C}"/>
+              </a:ext>
+            </a:extLst>
+          </p:cNvPr>
+          <p:cNvSpPr txBox="1"/>
+          <p:nvPr/>
+        </p:nvSpPr>
+        <p:spPr>
+          <a:xfrm>
+            <a:off x="927703" y="4172102"/>
+            <a:ext cx="10568879" cy="461665"/>
+          </a:xfrm>
+          <a:prstGeom prst="rect">
+            <a:avLst/>
+          </a:prstGeom>
+          <a:noFill/>
+        </p:spPr>
+        <p:txBody>
+          <a:bodyPr wrap="square" rtlCol="0">
+            <a:spAutoFit/>
+          </a:bodyPr>
+          <a:lstStyle/>
+          <a:p>
+            <a:r>
+              <a:rPr lang="en-US" sz="2400" dirty="0"/>
+              <a:t>5.000 </a:t>
+            </a:r>
+            <a:r>
+              <a:rPr lang="en-US" sz="2400" dirty="0" err="1"/>
+              <a:t>transacciones</a:t>
+            </a:r>
+            <a:r>
+              <a:rPr lang="en-US" sz="2400" dirty="0"/>
+              <a:t> </a:t>
+            </a:r>
+            <a:r>
+              <a:rPr lang="en-US" sz="2400" dirty="0" err="1"/>
+              <a:t>diarias</a:t>
+            </a:r>
+            <a:r>
+              <a:rPr lang="en-US" sz="2400" dirty="0"/>
+              <a:t> de las areas </a:t>
+            </a:r>
+            <a:r>
+              <a:rPr lang="en-US" sz="2400" dirty="0" err="1"/>
+              <a:t>contables</a:t>
+            </a:r>
+            <a:r>
+              <a:rPr lang="en-US" sz="2400" dirty="0"/>
+              <a:t> del banco </a:t>
+            </a:r>
+            <a:r>
+              <a:rPr lang="en-US" sz="2400" dirty="0" err="1"/>
+              <a:t>en</a:t>
+            </a:r>
+            <a:r>
+              <a:rPr lang="en-US" sz="2400" dirty="0"/>
+              <a:t> </a:t>
+            </a:r>
+            <a:r>
+              <a:rPr lang="en-US" sz="2400" dirty="0" err="1"/>
+              <a:t>bruto</a:t>
+            </a:r>
+            <a:endParaRPr lang="en-US" sz="2400" dirty="0"/>
+          </a:p>
+        </p:txBody>
+      </p:sp>
+      <p:sp>
+        <p:nvSpPr>
+          <p:cNvPr id="6" name="CuadroTexto 5">
+            <a:extLst>
+              <a:ext uri="{FF2B5EF4-FFF2-40B4-BE49-F238E27FC236}">
+                <a16:creationId xmlns:a16="http://schemas.microsoft.com/office/drawing/2014/main" id="{72377235-2693-4EB6-8818-97BD1BBDF19A}"/>
+              </a:ext>
+            </a:extLst>
+          </p:cNvPr>
+          <p:cNvSpPr txBox="1"/>
+          <p:nvPr/>
+        </p:nvSpPr>
+        <p:spPr>
+          <a:xfrm>
+            <a:off x="927703" y="5496133"/>
+            <a:ext cx="2068067" cy="523220"/>
+          </a:xfrm>
+          <a:prstGeom prst="rect">
+            <a:avLst/>
+          </a:prstGeom>
+          <a:noFill/>
+        </p:spPr>
+        <p:txBody>
+          <a:bodyPr wrap="none" rtlCol="0">
+            <a:spAutoFit/>
+          </a:bodyPr>
+          <a:lstStyle/>
+          <a:p>
+            <a:r>
+              <a:rPr lang="en-US" sz="2800" dirty="0" err="1">
+                <a:solidFill>
+                  <a:srgbClr val="0070C0"/>
+                </a:solidFill>
+              </a:rPr>
+              <a:t>Contribuci</a:t>
+            </a:r>
+            <a:r>
+              <a:rPr lang="es-BO" sz="2800" dirty="0" err="1">
+                <a:solidFill>
+                  <a:srgbClr val="0070C0"/>
+                </a:solidFill>
+              </a:rPr>
+              <a:t>ón</a:t>
+            </a:r>
+            <a:endParaRPr lang="en-US" sz="2800" dirty="0">
+              <a:solidFill>
+                <a:srgbClr val="0070C0"/>
+              </a:solidFill>
+            </a:endParaRPr>
+          </a:p>
+        </p:txBody>
+      </p:sp>
+      <p:sp>
+        <p:nvSpPr>
+          <p:cNvPr id="7" name="CuadroTexto 6">
+            <a:extLst>
+              <a:ext uri="{FF2B5EF4-FFF2-40B4-BE49-F238E27FC236}">
+                <a16:creationId xmlns:a16="http://schemas.microsoft.com/office/drawing/2014/main" id="{BBC79BF4-B531-4D20-9743-037079921F93}"/>
+              </a:ext>
+            </a:extLst>
+          </p:cNvPr>
+          <p:cNvSpPr txBox="1"/>
+          <p:nvPr/>
+        </p:nvSpPr>
+        <p:spPr>
+          <a:xfrm>
+            <a:off x="927703" y="6019353"/>
+            <a:ext cx="10568879" cy="461665"/>
+          </a:xfrm>
+          <a:prstGeom prst="rect">
+            <a:avLst/>
+          </a:prstGeom>
+          <a:noFill/>
+        </p:spPr>
+        <p:txBody>
+          <a:bodyPr wrap="square" rtlCol="0">
+            <a:spAutoFit/>
+          </a:bodyPr>
+          <a:lstStyle/>
+          <a:p>
+            <a:r>
+              <a:rPr lang="en-US" sz="2400" dirty="0"/>
+              <a:t>NER para </a:t>
+            </a:r>
+            <a:r>
+              <a:rPr lang="en-US" sz="2400" dirty="0" err="1"/>
+              <a:t>Análsis</a:t>
+            </a:r>
+            <a:r>
+              <a:rPr lang="en-US" sz="2400" dirty="0"/>
+              <a:t> de </a:t>
+            </a:r>
+            <a:r>
+              <a:rPr lang="en-US" sz="2400" dirty="0" err="1"/>
+              <a:t>relaciones</a:t>
+            </a:r>
+            <a:r>
+              <a:rPr lang="en-US" sz="2400" dirty="0"/>
+              <a:t> (</a:t>
+            </a:r>
+            <a:r>
+              <a:rPr lang="en-US" sz="2400" dirty="0" err="1"/>
+              <a:t>graphos</a:t>
+            </a:r>
+            <a:r>
+              <a:rPr lang="en-US" sz="2400" dirty="0"/>
+              <a:t>)</a:t>
+            </a:r>
+          </a:p>
+        </p:txBody>
+      </p:sp>
+      <p:sp>
+        <p:nvSpPr>
+          <p:cNvPr id="8" name="CuadroTexto 7">
+            <a:extLst>
+              <a:ext uri="{FF2B5EF4-FFF2-40B4-BE49-F238E27FC236}">
+                <a16:creationId xmlns:a16="http://schemas.microsoft.com/office/drawing/2014/main" id="{FDB6B04D-48C3-429E-981D-57D41B2343E7}"/>
+              </a:ext>
+            </a:extLst>
+          </p:cNvPr>
+          <p:cNvSpPr txBox="1"/>
+          <p:nvPr/>
+        </p:nvSpPr>
+        <p:spPr>
+          <a:xfrm>
+            <a:off x="927703" y="2633687"/>
+            <a:ext cx="10568879" cy="461665"/>
+          </a:xfrm>
+          <a:prstGeom prst="rect">
+            <a:avLst/>
+          </a:prstGeom>
+          <a:noFill/>
+        </p:spPr>
+        <p:txBody>
+          <a:bodyPr wrap="square" rtlCol="0">
+            <a:spAutoFit/>
+          </a:bodyPr>
+          <a:lstStyle/>
+          <a:p>
+            <a:r>
+              <a:rPr lang="en-US" sz="2400" dirty="0" err="1"/>
+              <a:t>Clasificador</a:t>
+            </a:r>
+            <a:r>
+              <a:rPr lang="en-US" sz="2400" dirty="0"/>
+              <a:t> de </a:t>
+            </a:r>
+            <a:r>
+              <a:rPr lang="en-US" sz="2400" dirty="0" err="1"/>
+              <a:t>transacciones</a:t>
+            </a:r>
+            <a:r>
+              <a:rPr lang="en-US" sz="2400" dirty="0"/>
+              <a:t> </a:t>
+            </a:r>
+            <a:r>
+              <a:rPr lang="en-US" sz="2400" dirty="0" err="1"/>
+              <a:t>en</a:t>
+            </a:r>
+            <a:r>
+              <a:rPr lang="en-US" sz="2400" dirty="0"/>
+              <a:t> base a la </a:t>
+            </a:r>
+            <a:r>
+              <a:rPr lang="en-US" sz="2400" dirty="0" err="1"/>
+              <a:t>glosa</a:t>
+            </a:r>
+            <a:r>
+              <a:rPr lang="en-US" sz="2400" dirty="0"/>
+              <a:t> de </a:t>
+            </a:r>
+            <a:r>
+              <a:rPr lang="en-US" sz="2400" dirty="0" err="1"/>
+              <a:t>comprobantes</a:t>
+            </a:r>
+            <a:r>
+              <a:rPr lang="en-US" sz="2400" dirty="0"/>
+              <a:t> </a:t>
+            </a:r>
+            <a:r>
+              <a:rPr lang="en-US" sz="2400" dirty="0" err="1"/>
+              <a:t>contables</a:t>
+            </a:r>
+            <a:endParaRPr lang="en-US" sz="2400" dirty="0"/>
+          </a:p>
+        </p:txBody>
+      </p:sp>
+      <p:sp>
+        <p:nvSpPr>
+          <p:cNvPr id="9" name="CuadroTexto 8">
+            <a:extLst>
+              <a:ext uri="{FF2B5EF4-FFF2-40B4-BE49-F238E27FC236}">
+                <a16:creationId xmlns:a16="http://schemas.microsoft.com/office/drawing/2014/main" id="{32D6EF7A-B43F-4E96-B762-4FB5EF723FB6}"/>
+              </a:ext>
+            </a:extLst>
+          </p:cNvPr>
+          <p:cNvSpPr txBox="1"/>
+          <p:nvPr/>
+        </p:nvSpPr>
+        <p:spPr>
+          <a:xfrm>
+            <a:off x="10200443" y="275208"/>
+            <a:ext cx="878889" cy="646331"/>
+          </a:xfrm>
+          <a:prstGeom prst="rect">
+            <a:avLst/>
+          </a:prstGeom>
+          <a:noFill/>
+        </p:spPr>
+        <p:txBody>
+          <a:bodyPr wrap="square" rtlCol="0">
+            <a:spAutoFit/>
+          </a:bodyPr>
+          <a:lstStyle/>
+          <a:p>
+            <a:r>
+              <a:rPr lang="es-BO" sz="3600" dirty="0"/>
+              <a:t>1</a:t>
+            </a:r>
+            <a:endParaRPr lang="en-US" sz="3600" dirty="0"/>
+          </a:p>
+        </p:txBody>
+      </p:sp>
     </p:spTree>
     <p:extLst>
       <p:ext uri="{BB962C8B-B14F-4D97-AF65-F5344CB8AC3E}">
-        <p14:creationId xmlns:p14="http://schemas.microsoft.com/office/powerpoint/2010/main" val="3463968538"/>
+        <p14:creationId xmlns:p14="http://schemas.microsoft.com/office/powerpoint/2010/main" val="400819840"/>
       </p:ext>
     </p:extLst>
   </p:cSld>
@@ -4414,40 +5929,380 @@
           <a:chExt cx="0" cy="0"/>
         </a:xfrm>
       </p:grpSpPr>
-      <p:pic>
-        <p:nvPicPr>
-          <p:cNvPr id="3" name="Imagen 2">
-            <a:extLst>
-              <a:ext uri="{FF2B5EF4-FFF2-40B4-BE49-F238E27FC236}">
-                <a16:creationId xmlns:a16="http://schemas.microsoft.com/office/drawing/2014/main" id="{E55FA54D-0F3A-420A-92F4-308BBFA4DC8F}"/>
-              </a:ext>
-            </a:extLst>
-          </p:cNvPr>
-          <p:cNvPicPr>
-            <a:picLocks noChangeAspect="1"/>
-          </p:cNvPicPr>
+      <p:sp>
+        <p:nvSpPr>
+          <p:cNvPr id="2" name="CuadroTexto 1">
+            <a:extLst>
+              <a:ext uri="{FF2B5EF4-FFF2-40B4-BE49-F238E27FC236}">
+                <a16:creationId xmlns:a16="http://schemas.microsoft.com/office/drawing/2014/main" id="{1B6E42D4-E5F1-4FED-BD50-EBDFA2FE7C6B}"/>
+              </a:ext>
+            </a:extLst>
+          </p:cNvPr>
+          <p:cNvSpPr txBox="1"/>
           <p:nvPr/>
-        </p:nvPicPr>
-        <p:blipFill>
-          <a:blip r:embed="rId2"/>
-          <a:stretch>
-            <a:fillRect/>
-          </a:stretch>
-        </p:blipFill>
-        <p:spPr>
-          <a:xfrm>
-            <a:off x="2803050" y="1154272"/>
-            <a:ext cx="6148468" cy="4003653"/>
+        </p:nvSpPr>
+        <p:spPr>
+          <a:xfrm>
+            <a:off x="927704" y="653981"/>
+            <a:ext cx="4327851" cy="523220"/>
           </a:xfrm>
           <a:prstGeom prst="rect">
             <a:avLst/>
           </a:prstGeom>
-        </p:spPr>
-      </p:pic>
+          <a:noFill/>
+        </p:spPr>
+        <p:txBody>
+          <a:bodyPr wrap="none" rtlCol="0">
+            <a:spAutoFit/>
+          </a:bodyPr>
+          <a:lstStyle/>
+          <a:p>
+            <a:r>
+              <a:rPr lang="en-US" sz="2800" dirty="0" err="1">
+                <a:solidFill>
+                  <a:srgbClr val="0070C0"/>
+                </a:solidFill>
+              </a:rPr>
+              <a:t>Planteamiento</a:t>
+            </a:r>
+            <a:r>
+              <a:rPr lang="en-US" sz="2800" dirty="0">
+                <a:solidFill>
+                  <a:srgbClr val="0070C0"/>
+                </a:solidFill>
+              </a:rPr>
+              <a:t> del </a:t>
+            </a:r>
+            <a:r>
+              <a:rPr lang="en-US" sz="2800" dirty="0" err="1">
+                <a:solidFill>
+                  <a:srgbClr val="0070C0"/>
+                </a:solidFill>
+              </a:rPr>
+              <a:t>Problema</a:t>
+            </a:r>
+            <a:endParaRPr lang="en-US" sz="2800" dirty="0">
+              <a:solidFill>
+                <a:srgbClr val="0070C0"/>
+              </a:solidFill>
+            </a:endParaRPr>
+          </a:p>
+        </p:txBody>
+      </p:sp>
+      <p:sp>
+        <p:nvSpPr>
+          <p:cNvPr id="3" name="CuadroTexto 2">
+            <a:extLst>
+              <a:ext uri="{FF2B5EF4-FFF2-40B4-BE49-F238E27FC236}">
+                <a16:creationId xmlns:a16="http://schemas.microsoft.com/office/drawing/2014/main" id="{B7AD633D-732E-4E2A-B6EE-2D77148DFDDA}"/>
+              </a:ext>
+            </a:extLst>
+          </p:cNvPr>
+          <p:cNvSpPr txBox="1"/>
+          <p:nvPr/>
+        </p:nvSpPr>
+        <p:spPr>
+          <a:xfrm>
+            <a:off x="927703" y="1606859"/>
+            <a:ext cx="10568879" cy="461665"/>
+          </a:xfrm>
+          <a:prstGeom prst="rect">
+            <a:avLst/>
+          </a:prstGeom>
+          <a:noFill/>
+        </p:spPr>
+        <p:txBody>
+          <a:bodyPr wrap="square" rtlCol="0">
+            <a:spAutoFit/>
+          </a:bodyPr>
+          <a:lstStyle/>
+          <a:p>
+            <a:r>
+              <a:rPr lang="es-BO" sz="2400" dirty="0"/>
+              <a:t>Indicadores alternativos de actividad económica en base a imágenes satelitales.</a:t>
+            </a:r>
+            <a:endParaRPr lang="en-US" sz="2400" dirty="0"/>
+          </a:p>
+        </p:txBody>
+      </p:sp>
+      <p:sp>
+        <p:nvSpPr>
+          <p:cNvPr id="4" name="CuadroTexto 3">
+            <a:extLst>
+              <a:ext uri="{FF2B5EF4-FFF2-40B4-BE49-F238E27FC236}">
+                <a16:creationId xmlns:a16="http://schemas.microsoft.com/office/drawing/2014/main" id="{73D108D2-6174-4ECF-B0EF-D6B0EC8452FC}"/>
+              </a:ext>
+            </a:extLst>
+          </p:cNvPr>
+          <p:cNvSpPr txBox="1"/>
+          <p:nvPr/>
+        </p:nvSpPr>
+        <p:spPr>
+          <a:xfrm>
+            <a:off x="927703" y="3613557"/>
+            <a:ext cx="2205604" cy="523220"/>
+          </a:xfrm>
+          <a:prstGeom prst="rect">
+            <a:avLst/>
+          </a:prstGeom>
+          <a:noFill/>
+        </p:spPr>
+        <p:txBody>
+          <a:bodyPr wrap="none" rtlCol="0">
+            <a:spAutoFit/>
+          </a:bodyPr>
+          <a:lstStyle/>
+          <a:p>
+            <a:r>
+              <a:rPr lang="en-US" sz="2800" dirty="0">
+                <a:solidFill>
+                  <a:srgbClr val="0070C0"/>
+                </a:solidFill>
+              </a:rPr>
+              <a:t>Base de </a:t>
+            </a:r>
+            <a:r>
+              <a:rPr lang="en-US" sz="2800" dirty="0" err="1">
+                <a:solidFill>
+                  <a:srgbClr val="0070C0"/>
+                </a:solidFill>
+              </a:rPr>
+              <a:t>datos</a:t>
+            </a:r>
+            <a:endParaRPr lang="en-US" sz="2800" dirty="0">
+              <a:solidFill>
+                <a:srgbClr val="0070C0"/>
+              </a:solidFill>
+            </a:endParaRPr>
+          </a:p>
+        </p:txBody>
+      </p:sp>
+      <p:sp>
+        <p:nvSpPr>
+          <p:cNvPr id="5" name="CuadroTexto 4">
+            <a:extLst>
+              <a:ext uri="{FF2B5EF4-FFF2-40B4-BE49-F238E27FC236}">
+                <a16:creationId xmlns:a16="http://schemas.microsoft.com/office/drawing/2014/main" id="{7D862125-6D3E-4ED8-80C0-AC9E6D65E19C}"/>
+              </a:ext>
+            </a:extLst>
+          </p:cNvPr>
+          <p:cNvSpPr txBox="1"/>
+          <p:nvPr/>
+        </p:nvSpPr>
+        <p:spPr>
+          <a:xfrm>
+            <a:off x="927703" y="4136777"/>
+            <a:ext cx="10568879" cy="461665"/>
+          </a:xfrm>
+          <a:prstGeom prst="rect">
+            <a:avLst/>
+          </a:prstGeom>
+          <a:noFill/>
+        </p:spPr>
+        <p:txBody>
+          <a:bodyPr wrap="square" rtlCol="0">
+            <a:spAutoFit/>
+          </a:bodyPr>
+          <a:lstStyle/>
+          <a:p>
+            <a:r>
+              <a:rPr lang="en-US" sz="2400" dirty="0"/>
+              <a:t>NASA, web</a:t>
+            </a:r>
+          </a:p>
+        </p:txBody>
+      </p:sp>
+      <p:sp>
+        <p:nvSpPr>
+          <p:cNvPr id="6" name="CuadroTexto 5">
+            <a:extLst>
+              <a:ext uri="{FF2B5EF4-FFF2-40B4-BE49-F238E27FC236}">
+                <a16:creationId xmlns:a16="http://schemas.microsoft.com/office/drawing/2014/main" id="{72377235-2693-4EB6-8818-97BD1BBDF19A}"/>
+              </a:ext>
+            </a:extLst>
+          </p:cNvPr>
+          <p:cNvSpPr txBox="1"/>
+          <p:nvPr/>
+        </p:nvSpPr>
+        <p:spPr>
+          <a:xfrm>
+            <a:off x="927703" y="5496133"/>
+            <a:ext cx="2068067" cy="523220"/>
+          </a:xfrm>
+          <a:prstGeom prst="rect">
+            <a:avLst/>
+          </a:prstGeom>
+          <a:noFill/>
+        </p:spPr>
+        <p:txBody>
+          <a:bodyPr wrap="none" rtlCol="0">
+            <a:spAutoFit/>
+          </a:bodyPr>
+          <a:lstStyle/>
+          <a:p>
+            <a:r>
+              <a:rPr lang="en-US" sz="2800" dirty="0" err="1">
+                <a:solidFill>
+                  <a:srgbClr val="0070C0"/>
+                </a:solidFill>
+              </a:rPr>
+              <a:t>Contribuci</a:t>
+            </a:r>
+            <a:r>
+              <a:rPr lang="es-BO" sz="2800" dirty="0" err="1">
+                <a:solidFill>
+                  <a:srgbClr val="0070C0"/>
+                </a:solidFill>
+              </a:rPr>
+              <a:t>ón</a:t>
+            </a:r>
+            <a:endParaRPr lang="en-US" sz="2800" dirty="0">
+              <a:solidFill>
+                <a:srgbClr val="0070C0"/>
+              </a:solidFill>
+            </a:endParaRPr>
+          </a:p>
+        </p:txBody>
+      </p:sp>
+      <p:sp>
+        <p:nvSpPr>
+          <p:cNvPr id="7" name="CuadroTexto 6">
+            <a:extLst>
+              <a:ext uri="{FF2B5EF4-FFF2-40B4-BE49-F238E27FC236}">
+                <a16:creationId xmlns:a16="http://schemas.microsoft.com/office/drawing/2014/main" id="{BBC79BF4-B531-4D20-9743-037079921F93}"/>
+              </a:ext>
+            </a:extLst>
+          </p:cNvPr>
+          <p:cNvSpPr txBox="1"/>
+          <p:nvPr/>
+        </p:nvSpPr>
+        <p:spPr>
+          <a:xfrm>
+            <a:off x="927703" y="6019353"/>
+            <a:ext cx="10568879" cy="461665"/>
+          </a:xfrm>
+          <a:prstGeom prst="rect">
+            <a:avLst/>
+          </a:prstGeom>
+          <a:noFill/>
+        </p:spPr>
+        <p:txBody>
+          <a:bodyPr wrap="square" rtlCol="0">
+            <a:spAutoFit/>
+          </a:bodyPr>
+          <a:lstStyle/>
+          <a:p>
+            <a:r>
+              <a:rPr lang="en-US" sz="2400" dirty="0" err="1"/>
+              <a:t>Indicador</a:t>
+            </a:r>
+            <a:r>
+              <a:rPr lang="en-US" sz="2400" dirty="0"/>
+              <a:t> </a:t>
+            </a:r>
+            <a:r>
+              <a:rPr lang="en-US" sz="2400" dirty="0" err="1"/>
+              <a:t>en</a:t>
+            </a:r>
+            <a:r>
+              <a:rPr lang="en-US" sz="2400" dirty="0"/>
+              <a:t> </a:t>
+            </a:r>
+            <a:r>
+              <a:rPr lang="en-US" sz="2400" dirty="0" err="1"/>
+              <a:t>tiempo</a:t>
+            </a:r>
+            <a:r>
+              <a:rPr lang="en-US" sz="2400" dirty="0"/>
+              <a:t> real. </a:t>
+            </a:r>
+            <a:r>
+              <a:rPr lang="en-US" sz="2400" dirty="0" err="1"/>
+              <a:t>Indicador</a:t>
+            </a:r>
+            <a:r>
+              <a:rPr lang="en-US" sz="2400" dirty="0"/>
+              <a:t> adelantado </a:t>
+            </a:r>
+          </a:p>
+        </p:txBody>
+      </p:sp>
+      <p:sp>
+        <p:nvSpPr>
+          <p:cNvPr id="9" name="CuadroTexto 8">
+            <a:extLst>
+              <a:ext uri="{FF2B5EF4-FFF2-40B4-BE49-F238E27FC236}">
+                <a16:creationId xmlns:a16="http://schemas.microsoft.com/office/drawing/2014/main" id="{7B5EF459-1DAA-4548-9023-2FC787C87DEF}"/>
+              </a:ext>
+            </a:extLst>
+          </p:cNvPr>
+          <p:cNvSpPr txBox="1"/>
+          <p:nvPr/>
+        </p:nvSpPr>
+        <p:spPr>
+          <a:xfrm>
+            <a:off x="927703" y="2210604"/>
+            <a:ext cx="10568879" cy="830997"/>
+          </a:xfrm>
+          <a:prstGeom prst="rect">
+            <a:avLst/>
+          </a:prstGeom>
+          <a:noFill/>
+        </p:spPr>
+        <p:txBody>
+          <a:bodyPr wrap="square" rtlCol="0">
+            <a:spAutoFit/>
+          </a:bodyPr>
+          <a:lstStyle/>
+          <a:p>
+            <a:r>
+              <a:rPr lang="es-BO" sz="2400" dirty="0"/>
+              <a:t>Análisis de luminiscencia de imágenes satelitales bajo el supuesto que a mayor luminiscencia, mayor actividad económica.</a:t>
+            </a:r>
+            <a:endParaRPr lang="en-US" sz="2400" dirty="0"/>
+          </a:p>
+        </p:txBody>
+      </p:sp>
+      <p:sp>
+        <p:nvSpPr>
+          <p:cNvPr id="10" name="CuadroTexto 9">
+            <a:extLst>
+              <a:ext uri="{FF2B5EF4-FFF2-40B4-BE49-F238E27FC236}">
+                <a16:creationId xmlns:a16="http://schemas.microsoft.com/office/drawing/2014/main" id="{D4813C33-3400-44EB-B73C-8317A2B1B2DC}"/>
+              </a:ext>
+            </a:extLst>
+          </p:cNvPr>
+          <p:cNvSpPr txBox="1"/>
+          <p:nvPr/>
+        </p:nvSpPr>
+        <p:spPr>
+          <a:xfrm>
+            <a:off x="10200443" y="275208"/>
+            <a:ext cx="878889" cy="646331"/>
+          </a:xfrm>
+          <a:prstGeom prst="rect">
+            <a:avLst/>
+          </a:prstGeom>
+          <a:noFill/>
+        </p:spPr>
+        <p:txBody>
+          <a:bodyPr wrap="square" rtlCol="0">
+            <a:spAutoFit/>
+          </a:bodyPr>
+          <a:lstStyle/>
+          <a:p>
+            <a:r>
+              <a:rPr lang="es-BO" sz="3600" dirty="0"/>
+              <a:t>2</a:t>
+            </a:r>
+            <a:endParaRPr lang="en-US" sz="3600" dirty="0"/>
+          </a:p>
+        </p:txBody>
+      </p:sp>
     </p:spTree>
     <p:extLst>
       <p:ext uri="{BB962C8B-B14F-4D97-AF65-F5344CB8AC3E}">
-        <p14:creationId xmlns:p14="http://schemas.microsoft.com/office/powerpoint/2010/main" val="240425033"/>
+        <p14:creationId xmlns:p14="http://schemas.microsoft.com/office/powerpoint/2010/main" val="3138092317"/>
       </p:ext>
     </p:extLst>
   </p:cSld>

</xml_diff>